<commit_message>
added manuscript, figures, and jupyter notebook
</commit_message>
<xml_diff>
--- a/word_documents_and_figures/figures_for_workflows/Pilot project levels_v3.pptx
+++ b/word_documents_and_figures/figures_for_workflows/Pilot project levels_v3.pptx
@@ -243,7 +243,7 @@
           <a:p>
             <a:fld id="{F3EAAB6A-4206-0144-83A0-B8A02F94C3A2}" type="datetimeFigureOut">
               <a:rPr lang="en-US" smtClean="0"/>
-              <a:t>5/11/20</a:t>
+              <a:t>5/26/20</a:t>
             </a:fld>
             <a:endParaRPr lang="en-US"/>
           </a:p>
@@ -413,7 +413,7 @@
           <a:p>
             <a:fld id="{F3EAAB6A-4206-0144-83A0-B8A02F94C3A2}" type="datetimeFigureOut">
               <a:rPr lang="en-US" smtClean="0"/>
-              <a:t>5/11/20</a:t>
+              <a:t>5/26/20</a:t>
             </a:fld>
             <a:endParaRPr lang="en-US"/>
           </a:p>
@@ -593,7 +593,7 @@
           <a:p>
             <a:fld id="{F3EAAB6A-4206-0144-83A0-B8A02F94C3A2}" type="datetimeFigureOut">
               <a:rPr lang="en-US" smtClean="0"/>
-              <a:t>5/11/20</a:t>
+              <a:t>5/26/20</a:t>
             </a:fld>
             <a:endParaRPr lang="en-US"/>
           </a:p>
@@ -763,7 +763,7 @@
           <a:p>
             <a:fld id="{F3EAAB6A-4206-0144-83A0-B8A02F94C3A2}" type="datetimeFigureOut">
               <a:rPr lang="en-US" smtClean="0"/>
-              <a:t>5/11/20</a:t>
+              <a:t>5/26/20</a:t>
             </a:fld>
             <a:endParaRPr lang="en-US"/>
           </a:p>
@@ -1007,7 +1007,7 @@
           <a:p>
             <a:fld id="{F3EAAB6A-4206-0144-83A0-B8A02F94C3A2}" type="datetimeFigureOut">
               <a:rPr lang="en-US" smtClean="0"/>
-              <a:t>5/11/20</a:t>
+              <a:t>5/26/20</a:t>
             </a:fld>
             <a:endParaRPr lang="en-US"/>
           </a:p>
@@ -1239,7 +1239,7 @@
           <a:p>
             <a:fld id="{F3EAAB6A-4206-0144-83A0-B8A02F94C3A2}" type="datetimeFigureOut">
               <a:rPr lang="en-US" smtClean="0"/>
-              <a:t>5/11/20</a:t>
+              <a:t>5/26/20</a:t>
             </a:fld>
             <a:endParaRPr lang="en-US"/>
           </a:p>
@@ -1606,7 +1606,7 @@
           <a:p>
             <a:fld id="{F3EAAB6A-4206-0144-83A0-B8A02F94C3A2}" type="datetimeFigureOut">
               <a:rPr lang="en-US" smtClean="0"/>
-              <a:t>5/11/20</a:t>
+              <a:t>5/26/20</a:t>
             </a:fld>
             <a:endParaRPr lang="en-US"/>
           </a:p>
@@ -1724,7 +1724,7 @@
           <a:p>
             <a:fld id="{F3EAAB6A-4206-0144-83A0-B8A02F94C3A2}" type="datetimeFigureOut">
               <a:rPr lang="en-US" smtClean="0"/>
-              <a:t>5/11/20</a:t>
+              <a:t>5/26/20</a:t>
             </a:fld>
             <a:endParaRPr lang="en-US"/>
           </a:p>
@@ -1819,7 +1819,7 @@
           <a:p>
             <a:fld id="{F3EAAB6A-4206-0144-83A0-B8A02F94C3A2}" type="datetimeFigureOut">
               <a:rPr lang="en-US" smtClean="0"/>
-              <a:t>5/11/20</a:t>
+              <a:t>5/26/20</a:t>
             </a:fld>
             <a:endParaRPr lang="en-US"/>
           </a:p>
@@ -2096,7 +2096,7 @@
           <a:p>
             <a:fld id="{F3EAAB6A-4206-0144-83A0-B8A02F94C3A2}" type="datetimeFigureOut">
               <a:rPr lang="en-US" smtClean="0"/>
-              <a:t>5/11/20</a:t>
+              <a:t>5/26/20</a:t>
             </a:fld>
             <a:endParaRPr lang="en-US"/>
           </a:p>
@@ -2353,7 +2353,7 @@
           <a:p>
             <a:fld id="{F3EAAB6A-4206-0144-83A0-B8A02F94C3A2}" type="datetimeFigureOut">
               <a:rPr lang="en-US" smtClean="0"/>
-              <a:t>5/11/20</a:t>
+              <a:t>5/26/20</a:t>
             </a:fld>
             <a:endParaRPr lang="en-US"/>
           </a:p>
@@ -2566,7 +2566,7 @@
           <a:p>
             <a:fld id="{F3EAAB6A-4206-0144-83A0-B8A02F94C3A2}" type="datetimeFigureOut">
               <a:rPr lang="en-US" smtClean="0"/>
-              <a:t>5/11/20</a:t>
+              <a:t>5/26/20</a:t>
             </a:fld>
             <a:endParaRPr lang="en-US"/>
           </a:p>
@@ -3020,7 +3020,7 @@
         </p:nvSpPr>
         <p:spPr>
           <a:xfrm>
-            <a:off x="4314859" y="2640248"/>
+            <a:off x="3188592" y="2640248"/>
             <a:ext cx="1289135" cy="369332"/>
           </a:xfrm>
           <a:prstGeom prst="rect">
@@ -3700,7 +3700,7 @@
         <p:spPr>
           <a:xfrm>
             <a:off x="3067790" y="1762352"/>
-            <a:ext cx="1891637" cy="877896"/>
+            <a:ext cx="765370" cy="877896"/>
           </a:xfrm>
           <a:prstGeom prst="straightConnector1">
             <a:avLst/>
@@ -3745,7 +3745,7 @@
         <p:spPr>
           <a:xfrm flipH="1">
             <a:off x="2799164" y="3009580"/>
-            <a:ext cx="2160263" cy="877896"/>
+            <a:ext cx="1033996" cy="877896"/>
           </a:xfrm>
           <a:prstGeom prst="straightConnector1">
             <a:avLst/>
@@ -3788,9 +3788,9 @@
           <p:nvPr/>
         </p:nvCxnSpPr>
         <p:spPr>
-          <a:xfrm flipH="1">
-            <a:off x="4033684" y="3009580"/>
-            <a:ext cx="925743" cy="877896"/>
+          <a:xfrm>
+            <a:off x="3833160" y="3009580"/>
+            <a:ext cx="200524" cy="877896"/>
           </a:xfrm>
           <a:prstGeom prst="straightConnector1">
             <a:avLst/>
@@ -3834,8 +3834,8 @@
         </p:nvCxnSpPr>
         <p:spPr>
           <a:xfrm>
-            <a:off x="4959427" y="3009580"/>
-            <a:ext cx="382645" cy="877896"/>
+            <a:off x="3833160" y="3009580"/>
+            <a:ext cx="1508912" cy="877896"/>
           </a:xfrm>
           <a:prstGeom prst="straightConnector1">
             <a:avLst/>
@@ -3879,8 +3879,8 @@
         </p:nvCxnSpPr>
         <p:spPr>
           <a:xfrm>
-            <a:off x="4959427" y="3009580"/>
-            <a:ext cx="1559136" cy="877896"/>
+            <a:off x="3833160" y="3009580"/>
+            <a:ext cx="2685403" cy="877896"/>
           </a:xfrm>
           <a:prstGeom prst="straightConnector1">
             <a:avLst/>
@@ -5207,8 +5207,8 @@
         </p:nvCxnSpPr>
         <p:spPr>
           <a:xfrm flipH="1">
-            <a:off x="4959427" y="1762352"/>
-            <a:ext cx="318942" cy="877896"/>
+            <a:off x="3833160" y="1762352"/>
+            <a:ext cx="1445209" cy="877896"/>
           </a:xfrm>
           <a:prstGeom prst="straightConnector1">
             <a:avLst/>
@@ -5253,8 +5253,8 @@
         </p:nvCxnSpPr>
         <p:spPr>
           <a:xfrm flipH="1">
-            <a:off x="4959427" y="1762352"/>
-            <a:ext cx="2588031" cy="877896"/>
+            <a:off x="3833160" y="1762352"/>
+            <a:ext cx="3714298" cy="877896"/>
           </a:xfrm>
           <a:prstGeom prst="straightConnector1">
             <a:avLst/>
@@ -5299,8 +5299,8 @@
         </p:nvCxnSpPr>
         <p:spPr>
           <a:xfrm flipH="1">
-            <a:off x="4959427" y="1762352"/>
-            <a:ext cx="4857119" cy="877896"/>
+            <a:off x="3833160" y="1762352"/>
+            <a:ext cx="5983386" cy="877896"/>
           </a:xfrm>
           <a:prstGeom prst="straightConnector1">
             <a:avLst/>
@@ -5621,8 +5621,8 @@
         </p:nvCxnSpPr>
         <p:spPr>
           <a:xfrm>
-            <a:off x="4959427" y="3009580"/>
-            <a:ext cx="2813216" cy="877896"/>
+            <a:off x="3833160" y="3009580"/>
+            <a:ext cx="3939483" cy="877896"/>
           </a:xfrm>
           <a:prstGeom prst="straightConnector1">
             <a:avLst/>
@@ -5667,8 +5667,8 @@
         </p:nvCxnSpPr>
         <p:spPr>
           <a:xfrm>
-            <a:off x="4959427" y="3009580"/>
-            <a:ext cx="4117214" cy="877896"/>
+            <a:off x="3833160" y="3009580"/>
+            <a:ext cx="5243481" cy="877896"/>
           </a:xfrm>
           <a:prstGeom prst="straightConnector1">
             <a:avLst/>
@@ -5713,8 +5713,8 @@
         </p:nvCxnSpPr>
         <p:spPr>
           <a:xfrm>
-            <a:off x="4959427" y="3009580"/>
-            <a:ext cx="5224587" cy="877896"/>
+            <a:off x="3833160" y="3009580"/>
+            <a:ext cx="6350854" cy="877896"/>
           </a:xfrm>
           <a:prstGeom prst="straightConnector1">
             <a:avLst/>
@@ -6181,7 +6181,7 @@
         </p:nvSpPr>
         <p:spPr>
           <a:xfrm>
-            <a:off x="7464088" y="2640247"/>
+            <a:off x="5518640" y="2640247"/>
             <a:ext cx="1625766" cy="369332"/>
           </a:xfrm>
           <a:prstGeom prst="rect">
@@ -6399,6 +6399,53 @@
           </a:fontRef>
         </p:style>
       </p:cxnSp>
+      <p:sp>
+        <p:nvSpPr>
+          <p:cNvPr id="81" name="TextBox 80">
+            <a:extLst>
+              <a:ext uri="{FF2B5EF4-FFF2-40B4-BE49-F238E27FC236}">
+                <a16:creationId xmlns:a16="http://schemas.microsoft.com/office/drawing/2014/main" id="{60812E5B-D83C-084F-9E77-FDE7FABC1B3D}"/>
+              </a:ext>
+            </a:extLst>
+          </p:cNvPr>
+          <p:cNvSpPr txBox="1"/>
+          <p:nvPr/>
+        </p:nvSpPr>
+        <p:spPr>
+          <a:xfrm>
+            <a:off x="8185320" y="2637037"/>
+            <a:ext cx="1855701" cy="369332"/>
+          </a:xfrm>
+          <a:prstGeom prst="rect">
+            <a:avLst/>
+          </a:prstGeom>
+          <a:solidFill>
+            <a:srgbClr val="00B0F0"/>
+          </a:solidFill>
+          <a:ln>
+            <a:solidFill>
+              <a:schemeClr val="tx1"/>
+            </a:solidFill>
+          </a:ln>
+        </p:spPr>
+        <p:txBody>
+          <a:bodyPr wrap="none" rtlCol="0">
+            <a:spAutoFit/>
+          </a:bodyPr>
+          <a:lstStyle/>
+          <a:p>
+            <a:pPr algn="ctr"/>
+            <a:r>
+              <a:rPr lang="en-US" dirty="0">
+                <a:solidFill>
+                  <a:sysClr val="windowText" lastClr="000000"/>
+                </a:solidFill>
+              </a:rPr>
+              <a:t>rRNA Filter (soon)</a:t>
+            </a:r>
+          </a:p>
+        </p:txBody>
+      </p:sp>
     </p:spTree>
     <p:extLst>
       <p:ext uri="{BB962C8B-B14F-4D97-AF65-F5344CB8AC3E}">

</xml_diff>